<commit_message>
Updates to the Presentations
</commit_message>
<xml_diff>
--- a/presentations/03-Sensors-and-Actuators.pptx
+++ b/presentations/03-Sensors-and-Actuators.pptx
@@ -213,7 +213,7 @@
           <a:p>
             <a:fld id="{55C0259C-16B0-4266-AFC7-1333BE129B15}" type="datetimeFigureOut">
               <a:rPr lang="en-US" smtClean="0"/>
-              <a:t>11/7/2017</a:t>
+              <a:t>2/7/2018</a:t>
             </a:fld>
             <a:endParaRPr lang="en-US"/>
           </a:p>
@@ -28004,7 +28004,7 @@
 </file>
 
 <file path=ppt/slides/slide6.xml><?xml version="1.0" encoding="utf-8"?>
-<p:sld xmlns:a="http://schemas.openxmlformats.org/drawingml/2006/main" xmlns:r="http://schemas.openxmlformats.org/officeDocument/2006/relationships" xmlns:p="http://schemas.openxmlformats.org/presentationml/2006/main">
+<p:sld xmlns:a="http://schemas.openxmlformats.org/drawingml/2006/main" xmlns:r="http://schemas.openxmlformats.org/officeDocument/2006/relationships" xmlns:p="http://schemas.openxmlformats.org/presentationml/2006/main" show="0">
   <p:cSld>
     <p:spTree>
       <p:nvGrpSpPr>
@@ -28248,13 +28248,13 @@
   <p:clrMapOvr>
     <a:masterClrMapping/>
   </p:clrMapOvr>
-  <mc:AlternateContent xmlns:mc="http://schemas.openxmlformats.org/markup-compatibility/2006" xmlns:p14="http://schemas.microsoft.com/office/powerpoint/2010/main">
-    <mc:Choice Requires="p14">
+  <mc:AlternateContent xmlns:mc="http://schemas.openxmlformats.org/markup-compatibility/2006">
+    <mc:Choice xmlns:p14="http://schemas.microsoft.com/office/powerpoint/2010/main" Requires="p14">
       <p:transition spd="med" p14:dur="700">
         <p:fade/>
       </p:transition>
     </mc:Choice>
-    <mc:Fallback xmlns="">
+    <mc:Fallback>
       <p:transition spd="med">
         <p:fade/>
       </p:transition>

</xml_diff>